<commit_message>
fix bug of notifying other nodes when delete stones
the notified node will not delete dump file when stones are deleted
</commit_message>
<xml_diff>
--- a/Diamond Miner Intro.pptx
+++ b/Diamond Miner Intro.pptx
@@ -122,7 +122,7 @@
   </p:defaultTextStyle>
   <p:extLst>
     <p:ext uri="{EFAFB233-063F-42B5-8137-9DF3F51BA10A}">
-      <p15:sldGuideLst xmlns:p15="http://schemas.microsoft.com/office/powerpoint/2012/main">
+      <p15:sldGuideLst xmlns:p15="http://schemas.microsoft.com/office/powerpoint/2012/main" xmlns="">
         <p15:guide id="1" orient="horz" pos="2160" userDrawn="1">
           <p15:clr>
             <a:srgbClr val="A4A3A4"/>
@@ -221,7 +221,7 @@
           <a:p>
             <a:fld id="{598ED131-D27B-49C1-99A8-A301900ED106}" type="datetimeFigureOut">
               <a:rPr lang="zh-CN" altLang="en-US" smtClean="0"/>
-              <a:t>2014/10/21</a:t>
+              <a:t>15/1/21</a:t>
             </a:fld>
             <a:endParaRPr lang="zh-CN" altLang="en-US"/>
           </a:p>
@@ -2010,7 +2010,7 @@
           <a:p>
             <a:fld id="{EB4A138F-191D-4BC7-80AB-52578C8866E8}" type="datetimeFigureOut">
               <a:rPr lang="zh-CN" altLang="en-US" smtClean="0"/>
-              <a:t>2014/10/21</a:t>
+              <a:t>15/1/21</a:t>
             </a:fld>
             <a:endParaRPr lang="zh-CN" altLang="en-US"/>
           </a:p>
@@ -2180,7 +2180,7 @@
           <a:p>
             <a:fld id="{EB4A138F-191D-4BC7-80AB-52578C8866E8}" type="datetimeFigureOut">
               <a:rPr lang="zh-CN" altLang="en-US" smtClean="0"/>
-              <a:t>2014/10/21</a:t>
+              <a:t>15/1/21</a:t>
             </a:fld>
             <a:endParaRPr lang="zh-CN" altLang="en-US"/>
           </a:p>
@@ -2360,7 +2360,7 @@
           <a:p>
             <a:fld id="{EB4A138F-191D-4BC7-80AB-52578C8866E8}" type="datetimeFigureOut">
               <a:rPr lang="zh-CN" altLang="en-US" smtClean="0"/>
-              <a:t>2014/10/21</a:t>
+              <a:t>15/1/21</a:t>
             </a:fld>
             <a:endParaRPr lang="zh-CN" altLang="en-US"/>
           </a:p>
@@ -2530,7 +2530,7 @@
           <a:p>
             <a:fld id="{EB4A138F-191D-4BC7-80AB-52578C8866E8}" type="datetimeFigureOut">
               <a:rPr lang="zh-CN" altLang="en-US" smtClean="0"/>
-              <a:t>2014/10/21</a:t>
+              <a:t>15/1/21</a:t>
             </a:fld>
             <a:endParaRPr lang="zh-CN" altLang="en-US"/>
           </a:p>
@@ -2774,7 +2774,7 @@
           <a:p>
             <a:fld id="{EB4A138F-191D-4BC7-80AB-52578C8866E8}" type="datetimeFigureOut">
               <a:rPr lang="zh-CN" altLang="en-US" smtClean="0"/>
-              <a:t>2014/10/21</a:t>
+              <a:t>15/1/21</a:t>
             </a:fld>
             <a:endParaRPr lang="zh-CN" altLang="en-US"/>
           </a:p>
@@ -3006,7 +3006,7 @@
           <a:p>
             <a:fld id="{EB4A138F-191D-4BC7-80AB-52578C8866E8}" type="datetimeFigureOut">
               <a:rPr lang="zh-CN" altLang="en-US" smtClean="0"/>
-              <a:t>2014/10/21</a:t>
+              <a:t>15/1/21</a:t>
             </a:fld>
             <a:endParaRPr lang="zh-CN" altLang="en-US"/>
           </a:p>
@@ -3373,7 +3373,7 @@
           <a:p>
             <a:fld id="{EB4A138F-191D-4BC7-80AB-52578C8866E8}" type="datetimeFigureOut">
               <a:rPr lang="zh-CN" altLang="en-US" smtClean="0"/>
-              <a:t>2014/10/21</a:t>
+              <a:t>15/1/21</a:t>
             </a:fld>
             <a:endParaRPr lang="zh-CN" altLang="en-US"/>
           </a:p>
@@ -3495,7 +3495,7 @@
           <a:p>
             <a:fld id="{EB4A138F-191D-4BC7-80AB-52578C8866E8}" type="datetimeFigureOut">
               <a:rPr lang="zh-CN" altLang="en-US" smtClean="0"/>
-              <a:t>2014/10/21</a:t>
+              <a:t>15/1/21</a:t>
             </a:fld>
             <a:endParaRPr lang="zh-CN" altLang="en-US"/>
           </a:p>
@@ -3590,7 +3590,7 @@
           <a:p>
             <a:fld id="{EB4A138F-191D-4BC7-80AB-52578C8866E8}" type="datetimeFigureOut">
               <a:rPr lang="zh-CN" altLang="en-US" smtClean="0"/>
-              <a:t>2014/10/21</a:t>
+              <a:t>15/1/21</a:t>
             </a:fld>
             <a:endParaRPr lang="zh-CN" altLang="en-US"/>
           </a:p>
@@ -3867,7 +3867,7 @@
           <a:p>
             <a:fld id="{EB4A138F-191D-4BC7-80AB-52578C8866E8}" type="datetimeFigureOut">
               <a:rPr lang="zh-CN" altLang="en-US" smtClean="0"/>
-              <a:t>2014/10/21</a:t>
+              <a:t>15/1/21</a:t>
             </a:fld>
             <a:endParaRPr lang="zh-CN" altLang="en-US"/>
           </a:p>
@@ -4124,7 +4124,7 @@
           <a:p>
             <a:fld id="{EB4A138F-191D-4BC7-80AB-52578C8866E8}" type="datetimeFigureOut">
               <a:rPr lang="zh-CN" altLang="en-US" smtClean="0"/>
-              <a:t>2014/10/21</a:t>
+              <a:t>15/1/21</a:t>
             </a:fld>
             <a:endParaRPr lang="zh-CN" altLang="en-US"/>
           </a:p>
@@ -4337,7 +4337,7 @@
           <a:p>
             <a:fld id="{EB4A138F-191D-4BC7-80AB-52578C8866E8}" type="datetimeFigureOut">
               <a:rPr lang="zh-CN" altLang="en-US" smtClean="0"/>
-              <a:t>2014/10/21</a:t>
+              <a:t>15/1/21</a:t>
             </a:fld>
             <a:endParaRPr lang="zh-CN" altLang="en-US"/>
           </a:p>
@@ -4831,7 +4831,7 @@
   <p:timing>
     <p:tnLst>
       <p:par>
-        <p:cTn id="1" dur="indefinite" restart="never" nodeType="tmRoot"/>
+        <p:cTn xmlns:p14="http://schemas.microsoft.com/office/powerpoint/2010/main" id="1" dur="indefinite" restart="never" nodeType="tmRoot"/>
       </p:par>
     </p:tnLst>
   </p:timing>
@@ -4918,11 +4918,7 @@
             <a:pPr lvl="1"/>
             <a:r>
               <a:rPr lang="zh-CN" altLang="en-US" sz="1600" dirty="0" smtClean="0"/>
-              <a:t>优先：当前</a:t>
-            </a:r>
-            <a:r>
-              <a:rPr lang="zh-CN" altLang="en-US" sz="1600" dirty="0" smtClean="0"/>
-              <a:t>目录下的</a:t>
+              <a:t>优先：当前目录下的</a:t>
             </a:r>
             <a:r>
               <a:rPr lang="en-US" altLang="zh-CN" sz="1600" dirty="0" smtClean="0"/>
@@ -5049,11 +5045,7 @@
             </a:r>
             <a:r>
               <a:rPr lang="en-US" altLang="zh-CN" sz="1600" dirty="0" smtClean="0"/>
-              <a:t>: </a:t>
-            </a:r>
-            <a:r>
-              <a:rPr lang="en-US" altLang="zh-CN" sz="1600" dirty="0" smtClean="0"/>
-              <a:t>diamond-</a:t>
+              <a:t>: diamond-</a:t>
             </a:r>
             <a:r>
               <a:rPr lang="en-US" altLang="zh-CN" sz="1600" dirty="0" err="1" smtClean="0"/>
@@ -5117,23 +5109,15 @@
             </a:r>
             <a:r>
               <a:rPr lang="zh-CN" altLang="en-US" sz="1600" dirty="0" smtClean="0"/>
-              <a:t>中有没有</a:t>
-            </a:r>
+              <a:t>中有没有定义</a:t>
+            </a:r>
+            <a:endParaRPr lang="en-US" altLang="zh-CN" sz="1600" dirty="0" smtClean="0"/>
+          </a:p>
+          <a:p>
+            <a:pPr lvl="1"/>
             <a:r>
               <a:rPr lang="zh-CN" altLang="en-US" sz="1600" dirty="0" smtClean="0"/>
-              <a:t>定义</a:t>
-            </a:r>
-            <a:endParaRPr lang="en-US" altLang="zh-CN" sz="1600" dirty="0" smtClean="0"/>
-          </a:p>
-          <a:p>
-            <a:pPr lvl="1"/>
-            <a:r>
-              <a:rPr lang="zh-CN" altLang="en-US" sz="1600" dirty="0" smtClean="0"/>
-              <a:t>注意</a:t>
-            </a:r>
-            <a:r>
-              <a:rPr lang="zh-CN" altLang="en-US" sz="1600" dirty="0" smtClean="0"/>
-              <a:t>：</a:t>
+              <a:t>注意：</a:t>
             </a:r>
             <a:r>
               <a:rPr lang="en-US" altLang="zh-CN" sz="1600" dirty="0" smtClean="0">
@@ -5228,11 +5212,7 @@
             </a:r>
             <a:r>
               <a:rPr lang="zh-CN" altLang="en-US" sz="1600" dirty="0" smtClean="0"/>
-              <a:t>请求一个配置，超时</a:t>
-            </a:r>
-            <a:r>
-              <a:rPr lang="zh-CN" altLang="en-US" sz="1600" dirty="0" smtClean="0"/>
-              <a:t>为</a:t>
+              <a:t>请求一个配置，超时为</a:t>
             </a:r>
             <a:r>
               <a:rPr lang="en-US" altLang="zh-CN" sz="1600" b="1" dirty="0" smtClean="0">
@@ -5284,11 +5264,7 @@
             </a:r>
             <a:r>
               <a:rPr lang="zh-CN" altLang="en-US" sz="1600" dirty="0" smtClean="0"/>
-              <a:t>连接超时</a:t>
-            </a:r>
-            <a:r>
-              <a:rPr lang="zh-CN" altLang="en-US" sz="1600" dirty="0" smtClean="0"/>
-              <a:t>为</a:t>
+              <a:t>连接超时为</a:t>
             </a:r>
             <a:r>
               <a:rPr lang="en-US" altLang="zh-CN" sz="1600" b="1" dirty="0" smtClean="0">
@@ -5320,11 +5296,7 @@
             </a:r>
             <a:r>
               <a:rPr lang="zh-CN" altLang="en-US" sz="1600" dirty="0" smtClean="0"/>
-              <a:t>缓存读时加载超时</a:t>
-            </a:r>
-            <a:r>
-              <a:rPr lang="zh-CN" altLang="en-US" sz="1600" dirty="0" smtClean="0"/>
-              <a:t>为</a:t>
+              <a:t>缓存读时加载超时为</a:t>
             </a:r>
             <a:r>
               <a:rPr lang="en-US" altLang="zh-CN" sz="1600" b="1" dirty="0">
@@ -5395,7 +5367,7 @@
   <p:timing>
     <p:tnLst>
       <p:par>
-        <p:cTn id="1" dur="indefinite" restart="never" nodeType="tmRoot"/>
+        <p:cTn xmlns:p14="http://schemas.microsoft.com/office/powerpoint/2010/main" id="1" dur="indefinite" restart="never" nodeType="tmRoot"/>
       </p:par>
     </p:tnLst>
   </p:timing>
@@ -5583,7 +5555,6 @@
               <a:rPr lang="en-US" altLang="zh-CN" dirty="0" smtClean="0"/>
               <a:t>diamond-server</a:t>
             </a:r>
-            <a:endParaRPr lang="en-US" altLang="zh-CN" dirty="0" smtClean="0"/>
           </a:p>
           <a:p>
             <a:pPr lvl="1"/>
@@ -5640,7 +5611,7 @@
   <p:timing>
     <p:tnLst>
       <p:par>
-        <p:cTn id="1" dur="indefinite" restart="never" nodeType="tmRoot"/>
+        <p:cTn xmlns:p14="http://schemas.microsoft.com/office/powerpoint/2010/main" id="1" dur="indefinite" restart="never" nodeType="tmRoot"/>
       </p:par>
     </p:tnLst>
   </p:timing>
@@ -5904,7 +5875,7 @@
   <p:timing>
     <p:tnLst>
       <p:par>
-        <p:cTn id="1" dur="indefinite" restart="never" nodeType="tmRoot"/>
+        <p:cTn xmlns:p14="http://schemas.microsoft.com/office/powerpoint/2010/main" id="1" dur="indefinite" restart="never" nodeType="tmRoot"/>
       </p:par>
     </p:tnLst>
   </p:timing>
@@ -6128,7 +6099,7 @@
   <p:timing>
     <p:tnLst>
       <p:par>
-        <p:cTn id="1" dur="indefinite" restart="never" nodeType="tmRoot"/>
+        <p:cTn xmlns:p14="http://schemas.microsoft.com/office/powerpoint/2010/main" id="1" dur="indefinite" restart="never" nodeType="tmRoot"/>
       </p:par>
     </p:tnLst>
   </p:timing>
@@ -6282,13 +6253,8 @@
             </a:r>
             <a:r>
               <a:rPr lang="zh-TW" altLang="en-US" sz="1600" dirty="0"/>
-              <a:t>很不友好</a:t>
-            </a:r>
-            <a:r>
-              <a:rPr lang="zh-TW" altLang="en-US" sz="1600" dirty="0"/>
-              <a:t>。</a:t>
-            </a:r>
-            <a:endParaRPr lang="zh-TW" altLang="en-US" sz="1600" dirty="0"/>
+              <a:t>很不友好。</a:t>
+            </a:r>
           </a:p>
           <a:p>
             <a:endParaRPr lang="zh-TW" altLang="en-US" sz="1600" dirty="0"/>
@@ -6306,19 +6272,12 @@
               <a:rPr lang="en-US" altLang="zh-TW" sz="1600" dirty="0">
                 <a:hlinkClick r:id="rId2"/>
               </a:rPr>
-              <a:t>https://github.com/bingoohuang/diamond-miner/blob/master/Diamond%20Miner%</a:t>
-            </a:r>
-            <a:r>
-              <a:rPr lang="en-US" altLang="zh-TW" sz="1600" dirty="0">
-                <a:hlinkClick r:id="rId2"/>
-              </a:rPr>
-              <a:t>20Intro.pptx</a:t>
+              <a:t>https://github.com/bingoohuang/diamond-miner/blob/master/Diamond%20Miner%20Intro.pptx</a:t>
             </a:r>
             <a:r>
               <a:rPr lang="en-US" altLang="zh-TW" sz="1600" dirty="0"/>
               <a:t> </a:t>
             </a:r>
-            <a:endParaRPr lang="en-US" altLang="zh-TW" sz="1600" dirty="0"/>
           </a:p>
           <a:p>
             <a:endParaRPr lang="en-US" altLang="zh-TW" sz="1600" dirty="0"/>
@@ -6344,19 +6303,12 @@
               <a:rPr lang="en-US" altLang="zh-TW" sz="1600" dirty="0">
                 <a:hlinkClick r:id="rId3"/>
               </a:rPr>
-              <a:t>http://rdc.taobao.com/team/jm/archives/</a:t>
-            </a:r>
-            <a:r>
-              <a:rPr lang="en-US" altLang="zh-TW" sz="1600" dirty="0">
-                <a:hlinkClick r:id="rId3"/>
-              </a:rPr>
-              <a:t>1588</a:t>
+              <a:t>http://rdc.taobao.com/team/jm/archives/1588</a:t>
             </a:r>
             <a:r>
               <a:rPr lang="en-US" altLang="zh-TW" sz="1600" dirty="0"/>
               <a:t> </a:t>
             </a:r>
-            <a:endParaRPr lang="en-US" altLang="zh-TW" sz="1600" dirty="0"/>
           </a:p>
           <a:p>
             <a:r>
@@ -6379,19 +6331,12 @@
               <a:rPr lang="en-US" altLang="zh-TW" sz="1600" dirty="0">
                 <a:hlinkClick r:id="rId4"/>
               </a:rPr>
-              <a:t>http://rdc.taobao.com/team/jm/archives/</a:t>
-            </a:r>
-            <a:r>
-              <a:rPr lang="en-US" altLang="zh-TW" sz="1600" dirty="0">
-                <a:hlinkClick r:id="rId4"/>
-              </a:rPr>
-              <a:t>1592</a:t>
+              <a:t>http://rdc.taobao.com/team/jm/archives/1592</a:t>
             </a:r>
             <a:r>
               <a:rPr lang="en-US" altLang="zh-TW" sz="1600" dirty="0"/>
               <a:t> </a:t>
             </a:r>
-            <a:endParaRPr lang="en-US" altLang="zh-TW" sz="1600" dirty="0"/>
           </a:p>
           <a:p>
             <a:r>
@@ -6414,19 +6359,12 @@
               <a:rPr lang="en-US" altLang="zh-TW" sz="1600" dirty="0">
                 <a:hlinkClick r:id="rId5"/>
               </a:rPr>
-              <a:t>http://rdc.taobao.com/team/jm/archives/</a:t>
-            </a:r>
-            <a:r>
-              <a:rPr lang="en-US" altLang="zh-TW" sz="1600" dirty="0">
-                <a:hlinkClick r:id="rId5"/>
-              </a:rPr>
-              <a:t>1606</a:t>
+              <a:t>http://rdc.taobao.com/team/jm/archives/1606</a:t>
             </a:r>
             <a:r>
               <a:rPr lang="en-US" altLang="zh-TW" sz="1600" dirty="0"/>
               <a:t>   </a:t>
             </a:r>
-            <a:endParaRPr lang="en-US" altLang="zh-TW" sz="1600" dirty="0"/>
           </a:p>
           <a:p>
             <a:r>
@@ -6449,19 +6387,12 @@
               <a:rPr lang="en-US" altLang="zh-TW" sz="1600" dirty="0">
                 <a:hlinkClick r:id="rId6"/>
               </a:rPr>
-              <a:t>http://rdc.taobao.com/team/jm/archives/</a:t>
-            </a:r>
-            <a:r>
-              <a:rPr lang="en-US" altLang="zh-TW" sz="1600" dirty="0">
-                <a:hlinkClick r:id="rId6"/>
-              </a:rPr>
-              <a:t>1617</a:t>
+              <a:t>http://rdc.taobao.com/team/jm/archives/1617</a:t>
             </a:r>
             <a:r>
               <a:rPr lang="en-US" altLang="zh-TW" sz="1600" dirty="0"/>
               <a:t> </a:t>
             </a:r>
-            <a:endParaRPr lang="en-US" altLang="zh-TW" sz="1600" dirty="0"/>
           </a:p>
           <a:p>
             <a:r>
@@ -6484,13 +6415,7 @@
               <a:rPr lang="en-US" altLang="zh-TW" sz="1600" dirty="0">
                 <a:hlinkClick r:id="rId7"/>
               </a:rPr>
-              <a:t>http://rdc.taobao.com/team/jm</a:t>
-            </a:r>
-            <a:r>
-              <a:rPr lang="en-US" altLang="zh-TW" sz="1600" dirty="0">
-                <a:hlinkClick r:id="rId7"/>
-              </a:rPr>
-              <a:t>/archives/2561</a:t>
+              <a:t>http://rdc.taobao.com/team/jm/archives/2561</a:t>
             </a:r>
             <a:r>
               <a:rPr lang="en-US" altLang="zh-TW" sz="1600" dirty="0"/>
@@ -6595,7 +6520,7 @@
   <p:timing>
     <p:tnLst>
       <p:par>
-        <p:cTn id="1" dur="indefinite" restart="never" nodeType="tmRoot"/>
+        <p:cTn xmlns:p14="http://schemas.microsoft.com/office/powerpoint/2010/main" id="1" dur="indefinite" restart="never" nodeType="tmRoot"/>
       </p:par>
     </p:tnLst>
   </p:timing>
@@ -9505,7 +9430,7 @@
           <a:noFill/>
           <a:extLst>
             <a:ext uri="{909E8E84-426E-40dd-AFC4-6F175D3DCCD1}">
-              <a14:hiddenFill xmlns:a14="http://schemas.microsoft.com/office/drawing/2010/main" xmlns="">
+              <a14:hiddenFill xmlns:a14="http://schemas.microsoft.com/office/drawing/2010/main">
                 <a:solidFill>
                   <a:srgbClr val="FFFFFF"/>
                 </a:solidFill>
@@ -9538,7 +9463,7 @@
   <p:timing>
     <p:tnLst>
       <p:par>
-        <p:cTn id="1" dur="indefinite" restart="never" nodeType="tmRoot"/>
+        <p:cTn xmlns:p14="http://schemas.microsoft.com/office/powerpoint/2010/main" id="1" dur="indefinite" restart="never" nodeType="tmRoot"/>
       </p:par>
     </p:tnLst>
   </p:timing>
@@ -9648,69 +9573,26 @@
           <a:p>
             <a:pPr lvl="1"/>
             <a:r>
-              <a:rPr lang="en-US" altLang="zh-CN" dirty="0" err="1" smtClean="0"/>
-              <a:t>mvn</a:t>
+              <a:rPr lang="en-US" altLang="zh-CN" dirty="0" err="1"/>
+              <a:t>m</a:t>
+            </a:r>
+            <a:r>
+              <a:rPr lang="en-US" altLang="zh-CN" smtClean="0"/>
+              <a:t>vn</a:t>
             </a:r>
             <a:r>
               <a:rPr lang="en-US" altLang="zh-CN" dirty="0" smtClean="0"/>
               <a:t> </a:t>
             </a:r>
             <a:r>
-              <a:rPr lang="en-US" altLang="zh-CN" dirty="0" err="1" smtClean="0"/>
-              <a:t>jetty:run</a:t>
+              <a:rPr lang="en-US" altLang="zh-CN" dirty="0" smtClean="0"/>
+              <a:t>package</a:t>
             </a:r>
             <a:endParaRPr lang="en-US" altLang="zh-CN" dirty="0" smtClean="0"/>
           </a:p>
           <a:p>
             <a:pPr lvl="1"/>
             <a:endParaRPr lang="en-US" altLang="zh-CN" dirty="0" smtClean="0"/>
-          </a:p>
-          <a:p>
-            <a:r>
-              <a:rPr lang="en-US" altLang="zh-CN" dirty="0" smtClean="0"/>
-              <a:t>WAR</a:t>
-            </a:r>
-            <a:r>
-              <a:rPr lang="zh-CN" altLang="en-US" dirty="0" smtClean="0"/>
-              <a:t>包形式</a:t>
-            </a:r>
-            <a:endParaRPr lang="en-US" altLang="zh-CN" dirty="0" smtClean="0"/>
-          </a:p>
-          <a:p>
-            <a:pPr lvl="1"/>
-            <a:r>
-              <a:rPr lang="zh-CN" altLang="en-US" dirty="0" smtClean="0"/>
-              <a:t>下载包</a:t>
-            </a:r>
-            <a:r>
-              <a:rPr lang="en-US" altLang="zh-CN" dirty="0">
-                <a:hlinkClick r:id="rId3"/>
-              </a:rPr>
-              <a:t>https://</a:t>
-            </a:r>
-            <a:r>
-              <a:rPr lang="en-US" altLang="zh-CN" dirty="0" smtClean="0">
-                <a:hlinkClick r:id="rId3"/>
-              </a:rPr>
-              <a:t>github.com/bingoohuang/diamond-miner/releases/download/v0.0.1/diamond-server-0.0.1.war</a:t>
-            </a:r>
-            <a:r>
-              <a:rPr lang="en-US" altLang="zh-CN" dirty="0" smtClean="0"/>
-              <a:t> </a:t>
-            </a:r>
-            <a:endParaRPr lang="en-US" altLang="zh-CN" dirty="0"/>
-          </a:p>
-          <a:p>
-            <a:pPr lvl="1"/>
-            <a:r>
-              <a:rPr lang="en-US" altLang="zh-CN" dirty="0" smtClean="0"/>
-              <a:t>java </a:t>
-            </a:r>
-            <a:r>
-              <a:rPr lang="en-US" altLang="zh-CN" dirty="0"/>
-              <a:t>-jar diamond-server-0.0.1.war </a:t>
-            </a:r>
-            <a:endParaRPr lang="zh-CN" altLang="en-US" dirty="0"/>
           </a:p>
         </p:txBody>
       </p:sp>
@@ -9727,7 +9609,7 @@
   <p:timing>
     <p:tnLst>
       <p:par>
-        <p:cTn id="1" dur="indefinite" restart="never" nodeType="tmRoot"/>
+        <p:cTn xmlns:p14="http://schemas.microsoft.com/office/powerpoint/2010/main" id="1" dur="indefinite" restart="never" nodeType="tmRoot"/>
       </p:par>
     </p:tnLst>
   </p:timing>
@@ -10224,17 +10106,7 @@
                 <a:latin typeface="Consolas" panose="020B0609020204030204" pitchFamily="49" charset="0"/>
                 <a:cs typeface="Consolas" panose="020B0609020204030204" pitchFamily="49" charset="0"/>
               </a:rPr>
-              <a:t>// @org.n3r.diamond.client.DemoUpdater("${bar}") @Timestamp("${bar}-09-31 08:41:26.335</a:t>
-            </a:r>
-            <a:r>
-              <a:rPr lang="en-US" altLang="zh-CN" sz="1350" i="1" dirty="0">
-                <a:solidFill>
-                  <a:srgbClr val="008800"/>
-                </a:solidFill>
-                <a:latin typeface="Consolas" panose="020B0609020204030204" pitchFamily="49" charset="0"/>
-                <a:cs typeface="Consolas" panose="020B0609020204030204" pitchFamily="49" charset="0"/>
-              </a:rPr>
-              <a:t>")</a:t>
+              <a:t>// @org.n3r.diamond.client.DemoUpdater("${bar}") @Timestamp("${bar}-09-31 08:41:26.335")</a:t>
             </a:r>
           </a:p>
           <a:p>
@@ -10351,7 +10223,7 @@
   <p:timing>
     <p:tnLst>
       <p:par>
-        <p:cTn id="1" dur="indefinite" restart="never" nodeType="tmRoot"/>
+        <p:cTn xmlns:p14="http://schemas.microsoft.com/office/powerpoint/2010/main" id="1" dur="indefinite" restart="never" nodeType="tmRoot"/>
       </p:par>
     </p:tnLst>
   </p:timing>
@@ -10452,7 +10324,6 @@
               <a:rPr lang="zh-CN" altLang="en-US" sz="1350" dirty="0"/>
               <a:t>本地容灾目录</a:t>
             </a:r>
-            <a:endParaRPr lang="zh-CN" altLang="en-US" sz="1350" dirty="0"/>
           </a:p>
         </p:txBody>
       </p:sp>
@@ -10593,7 +10464,6 @@
               <a:rPr lang="zh-CN" altLang="en-US" sz="1350" dirty="0"/>
               <a:t>请求</a:t>
             </a:r>
-            <a:endParaRPr lang="zh-CN" altLang="en-US" sz="1350" dirty="0"/>
           </a:p>
         </p:txBody>
       </p:sp>
@@ -10623,7 +10493,6 @@
               <a:rPr lang="zh-CN" altLang="en-US" sz="1350" dirty="0"/>
               <a:t>本地快照</a:t>
             </a:r>
-            <a:endParaRPr lang="zh-CN" altLang="en-US" sz="1350" dirty="0"/>
           </a:p>
         </p:txBody>
       </p:sp>
@@ -10720,7 +10589,7 @@
   <p:timing>
     <p:tnLst>
       <p:par>
-        <p:cTn id="1" dur="indefinite" restart="never" nodeType="tmRoot"/>
+        <p:cTn xmlns:p14="http://schemas.microsoft.com/office/powerpoint/2010/main" id="1" dur="indefinite" restart="never" nodeType="tmRoot"/>
       </p:par>
     </p:tnLst>
   </p:timing>
@@ -10820,14 +10689,7 @@
                 <a:latin typeface="Consolas" panose="020B0609020204030204" pitchFamily="49" charset="0"/>
                 <a:cs typeface="Consolas" panose="020B0609020204030204" pitchFamily="49" charset="0"/>
               </a:rPr>
-              <a:t>.</a:t>
-            </a:r>
-            <a:r>
-              <a:rPr lang="zh-CN" altLang="en-US" sz="1350" dirty="0">
-                <a:latin typeface="Consolas" panose="020B0609020204030204" pitchFamily="49" charset="0"/>
-                <a:cs typeface="Consolas" panose="020B0609020204030204" pitchFamily="49" charset="0"/>
-              </a:rPr>
-              <a:t>diamond-client</a:t>
+              <a:t>.diamond-client</a:t>
             </a:r>
           </a:p>
           <a:p>
@@ -10935,30 +10797,16 @@
                 <a:latin typeface="Consolas" panose="020B0609020204030204" pitchFamily="49" charset="0"/>
                 <a:cs typeface="Consolas" panose="020B0609020204030204" pitchFamily="49" charset="0"/>
               </a:rPr>
-              <a:t>.</a:t>
-            </a:r>
+              <a:t>.diamond-server</a:t>
+            </a:r>
+          </a:p>
+          <a:p>
             <a:r>
               <a:rPr lang="zh-CN" altLang="en-US" sz="1350" dirty="0">
                 <a:latin typeface="Consolas" panose="020B0609020204030204" pitchFamily="49" charset="0"/>
                 <a:cs typeface="Consolas" panose="020B0609020204030204" pitchFamily="49" charset="0"/>
               </a:rPr>
-              <a:t>diamond-server</a:t>
-            </a:r>
-          </a:p>
-          <a:p>
-            <a:r>
-              <a:rPr lang="zh-CN" altLang="en-US" sz="1350" dirty="0">
-                <a:latin typeface="Consolas" panose="020B0609020204030204" pitchFamily="49" charset="0"/>
-                <a:cs typeface="Consolas" panose="020B0609020204030204" pitchFamily="49" charset="0"/>
-              </a:rPr>
-              <a:t>|____config-</a:t>
-            </a:r>
-            <a:r>
-              <a:rPr lang="zh-CN" altLang="en-US" sz="1350" dirty="0">
-                <a:latin typeface="Consolas" panose="020B0609020204030204" pitchFamily="49" charset="0"/>
-                <a:cs typeface="Consolas" panose="020B0609020204030204" pitchFamily="49" charset="0"/>
-              </a:rPr>
-              <a:t>d</a:t>
+              <a:t>|____config-d</a:t>
             </a:r>
             <a:r>
               <a:rPr lang="en-US" altLang="zh-CN" sz="1350" dirty="0">
@@ -11068,7 +10916,7 @@
   <p:timing>
     <p:tnLst>
       <p:par>
-        <p:cTn id="1" dur="indefinite" restart="never" nodeType="tmRoot"/>
+        <p:cTn xmlns:p14="http://schemas.microsoft.com/office/powerpoint/2010/main" id="1" dur="indefinite" restart="never" nodeType="tmRoot"/>
       </p:par>
     </p:tnLst>
   </p:timing>
@@ -11118,7 +10966,7 @@
     </a:clrScheme>
     <a:fontScheme name="Office 主题">
       <a:majorFont>
-        <a:latin typeface="Calibri Light" panose="020F0302020204030204"/>
+        <a:latin typeface="Calibri Light"/>
         <a:ea typeface=""/>
         <a:cs typeface=""/>
         <a:font script="Jpan" typeface="ＭＳ Ｐゴシック"/>
@@ -11153,7 +11001,7 @@
         <a:font script="Geor" typeface="Sylfaen"/>
       </a:majorFont>
       <a:minorFont>
-        <a:latin typeface="Calibri" panose="020F0502020204030204"/>
+        <a:latin typeface="Calibri"/>
         <a:ea typeface=""/>
         <a:cs typeface=""/>
         <a:font script="Jpan" typeface="ＭＳ Ｐゴシック"/>
@@ -11330,7 +11178,7 @@
   <a:extraClrSchemeLst/>
   <a:extLst>
     <a:ext uri="{05A4C25C-085E-4340-85A3-A5531E510DB2}">
-      <thm15:themeFamily xmlns:thm15="http://schemas.microsoft.com/office/thememl/2012/main" name="Office Theme" id="{62F939B6-93AF-4DB8-9C6B-D6C7DFDC589F}" vid="{4A3C46E8-61CC-4603-A589-7422A47A8E4A}"/>
+      <thm15:themeFamily xmlns:thm15="http://schemas.microsoft.com/office/thememl/2012/main" xmlns="" name="Office Theme" id="{62F939B6-93AF-4DB8-9C6B-D6C7DFDC589F}" vid="{4A3C46E8-61CC-4603-A589-7422A47A8E4A}"/>
     </a:ext>
   </a:extLst>
 </a:theme>
@@ -11591,7 +11439,7 @@
   <a:extraClrSchemeLst/>
   <a:extLst>
     <a:ext uri="{05A4C25C-085E-4340-85A3-A5531E510DB2}">
-      <thm15:themeFamily xmlns:thm15="http://schemas.microsoft.com/office/thememl/2012/main" name="Office Theme" id="{62F939B6-93AF-4DB8-9C6B-D6C7DFDC589F}" vid="{4A3C46E8-61CC-4603-A589-7422A47A8E4A}"/>
+      <thm15:themeFamily xmlns:thm15="http://schemas.microsoft.com/office/thememl/2012/main" xmlns="" name="Office Theme" id="{62F939B6-93AF-4DB8-9C6B-D6C7DFDC589F}" vid="{4A3C46E8-61CC-4603-A589-7422A47A8E4A}"/>
     </a:ext>
   </a:extLst>
 </a:theme>

</xml_diff>